<commit_message>
Final changes: updated seizure images in presentation
</commit_message>
<xml_diff>
--- a/misc/presentation/AML_2024_Group_18_EEG_Diffusion.pptx
+++ b/misc/presentation/AML_2024_Group_18_EEG_Diffusion.pptx
@@ -6811,7 +6811,7 @@
         <p:spPr>
           <a:xfrm>
             <a:off x="311700" y="2834125"/>
-            <a:ext cx="8520600" cy="1626600"/>
+            <a:ext cx="8520600" cy="1942500"/>
           </a:xfrm>
           <a:prstGeom prst="rect">
             <a:avLst/>
@@ -6819,7 +6819,7 @@
         </p:spPr>
         <p:txBody>
           <a:bodyPr anchorCtr="0" anchor="t" bIns="91425" lIns="91425" spcFirstLastPara="1" rIns="91425" wrap="square" tIns="91425">
-            <a:normAutofit fontScale="92500" lnSpcReduction="10000"/>
+            <a:normAutofit fontScale="85000" lnSpcReduction="20000"/>
           </a:bodyPr>
           <a:lstStyle/>
           <a:p>
@@ -6849,8 +6849,38 @@
               <a:buNone/>
             </a:pPr>
             <a:r>
+              <a:t/>
+            </a:r>
+            <a:endParaRPr/>
+          </a:p>
+          <a:p>
+            <a:pPr indent="0" lvl="0" marL="0" rtl="0" algn="ctr">
+              <a:spcBef>
+                <a:spcPts val="0"/>
+              </a:spcBef>
+              <a:spcAft>
+                <a:spcPts val="0"/>
+              </a:spcAft>
+              <a:buNone/>
+            </a:pPr>
+            <a:r>
               <a:rPr lang="de"/>
-              <a:t>by</a:t>
+              <a:t>27.05.2024</a:t>
+            </a:r>
+            <a:endParaRPr/>
+          </a:p>
+          <a:p>
+            <a:pPr indent="0" lvl="0" marL="0" rtl="0" algn="ctr">
+              <a:spcBef>
+                <a:spcPts val="0"/>
+              </a:spcBef>
+              <a:spcAft>
+                <a:spcPts val="0"/>
+              </a:spcAft>
+              <a:buNone/>
+            </a:pPr>
+            <a:r>
+              <a:t/>
             </a:r>
             <a:endParaRPr/>
           </a:p>
@@ -7961,7 +7991,7 @@
         </p:nvSpPr>
         <p:spPr>
           <a:xfrm>
-            <a:off x="1322400" y="4675850"/>
+            <a:off x="1195013" y="4478500"/>
             <a:ext cx="1672800" cy="256800"/>
           </a:xfrm>
           <a:prstGeom prst="rect">
@@ -8011,7 +8041,7 @@
         </p:nvSpPr>
         <p:spPr>
           <a:xfrm>
-            <a:off x="4237425" y="4703625"/>
+            <a:off x="3977200" y="4478500"/>
             <a:ext cx="1672800" cy="256800"/>
           </a:xfrm>
           <a:prstGeom prst="rect">
@@ -8165,25 +8195,30 @@
           <p:cNvPicPr preferRelativeResize="0"/>
           <p:nvPr/>
         </p:nvPicPr>
-        <p:blipFill>
+        <p:blipFill rotWithShape="1">
           <a:blip r:embed="rId4">
             <a:alphaModFix/>
           </a:blip>
-          <a:stretch>
-            <a:fillRect/>
-          </a:stretch>
+          <a:srcRect b="0" l="16054" r="16061" t="0"/>
+          <a:stretch/>
         </p:blipFill>
         <p:spPr>
           <a:xfrm>
-            <a:off x="854350" y="2571750"/>
-            <a:ext cx="2472038" cy="2170774"/>
+            <a:off x="520400" y="2727650"/>
+            <a:ext cx="2652825" cy="1665600"/>
           </a:xfrm>
           <a:prstGeom prst="rect">
             <a:avLst/>
           </a:prstGeom>
           <a:noFill/>
-          <a:ln>
-            <a:noFill/>
+          <a:ln cap="flat" cmpd="sng" w="9525">
+            <a:solidFill>
+              <a:schemeClr val="dk1"/>
+            </a:solidFill>
+            <a:prstDash val="solid"/>
+            <a:round/>
+            <a:headEnd len="sm" w="sm" type="none"/>
+            <a:tailEnd len="sm" w="sm" type="none"/>
           </a:ln>
         </p:spPr>
       </p:pic>
@@ -8193,25 +8228,30 @@
           <p:cNvPicPr preferRelativeResize="0"/>
           <p:nvPr/>
         </p:nvPicPr>
-        <p:blipFill>
+        <p:blipFill rotWithShape="1">
           <a:blip r:embed="rId5">
             <a:alphaModFix/>
           </a:blip>
-          <a:stretch>
-            <a:fillRect/>
-          </a:stretch>
+          <a:srcRect b="0" l="2525" r="2525" t="0"/>
+          <a:stretch/>
         </p:blipFill>
         <p:spPr>
           <a:xfrm>
-            <a:off x="3637450" y="2571751"/>
-            <a:ext cx="2466408" cy="2170774"/>
+            <a:off x="3416000" y="2727650"/>
+            <a:ext cx="2652825" cy="1665600"/>
           </a:xfrm>
           <a:prstGeom prst="rect">
             <a:avLst/>
           </a:prstGeom>
           <a:noFill/>
-          <a:ln>
-            <a:noFill/>
+          <a:ln cap="flat" cmpd="sng" w="9525">
+            <a:solidFill>
+              <a:schemeClr val="dk1"/>
+            </a:solidFill>
+            <a:prstDash val="solid"/>
+            <a:round/>
+            <a:headEnd len="sm" w="sm" type="none"/>
+            <a:tailEnd len="sm" w="sm" type="none"/>
           </a:ln>
         </p:spPr>
       </p:pic>

</xml_diff>